<commit_message>
updated FNC challenge slides minimally
</commit_message>
<xml_diff>
--- a/Slides/Day2_NLP_FakeNewsChallenge.pptx
+++ b/Slides/Day2_NLP_FakeNewsChallenge.pptx
@@ -5,7 +5,7 @@
     <p:sldMasterId id="2147483648" r:id="rId1"/>
   </p:sldMasterIdLst>
   <p:notesMasterIdLst>
-    <p:notesMasterId r:id="rId18"/>
+    <p:notesMasterId r:id="rId19"/>
   </p:notesMasterIdLst>
   <p:sldIdLst>
     <p:sldId id="256" r:id="rId2"/>
@@ -24,6 +24,7 @@
     <p:sldId id="274" r:id="rId15"/>
     <p:sldId id="275" r:id="rId16"/>
     <p:sldId id="276" r:id="rId17"/>
+    <p:sldId id="278" r:id="rId18"/>
   </p:sldIdLst>
   <p:sldSz cx="12192000" cy="6858000"/>
   <p:notesSz cx="6858000" cy="9144000"/>
@@ -122,6 +123,11 @@
       </a:defRPr>
     </a:lvl9pPr>
   </p:defaultTextStyle>
+  <p:extLst>
+    <p:ext uri="{EFAFB233-063F-42B5-8137-9DF3F51BA10A}">
+      <p15:sldGuideLst xmlns:p15="http://schemas.microsoft.com/office/powerpoint/2012/main"/>
+    </p:ext>
+  </p:extLst>
 </p:presentation>
 </file>
 
@@ -207,7 +213,7 @@
           <a:p>
             <a:fld id="{31A8A4BD-1076-804C-96C9-61E51E7770A7}" type="datetimeFigureOut">
               <a:rPr lang="en-US" smtClean="0"/>
-              <a:t>6/27/18</a:t>
+              <a:t>7/13/18</a:t>
             </a:fld>
             <a:endParaRPr lang="en-US"/>
           </a:p>
@@ -1665,7 +1671,7 @@
           <a:p>
             <a:fld id="{C50CB83D-D45D-C944-BFF6-54245A66EDFC}" type="datetimeFigureOut">
               <a:rPr lang="en-US" smtClean="0"/>
-              <a:t>6/27/18</a:t>
+              <a:t>7/13/18</a:t>
             </a:fld>
             <a:endParaRPr lang="en-US"/>
           </a:p>
@@ -1863,7 +1869,7 @@
           <a:p>
             <a:fld id="{C50CB83D-D45D-C944-BFF6-54245A66EDFC}" type="datetimeFigureOut">
               <a:rPr lang="en-US" smtClean="0"/>
-              <a:t>6/27/18</a:t>
+              <a:t>7/13/18</a:t>
             </a:fld>
             <a:endParaRPr lang="en-US"/>
           </a:p>
@@ -2071,7 +2077,7 @@
           <a:p>
             <a:fld id="{C50CB83D-D45D-C944-BFF6-54245A66EDFC}" type="datetimeFigureOut">
               <a:rPr lang="en-US" smtClean="0"/>
-              <a:t>6/27/18</a:t>
+              <a:t>7/13/18</a:t>
             </a:fld>
             <a:endParaRPr lang="en-US"/>
           </a:p>
@@ -2269,7 +2275,7 @@
           <a:p>
             <a:fld id="{C50CB83D-D45D-C944-BFF6-54245A66EDFC}" type="datetimeFigureOut">
               <a:rPr lang="en-US" smtClean="0"/>
-              <a:t>6/27/18</a:t>
+              <a:t>7/13/18</a:t>
             </a:fld>
             <a:endParaRPr lang="en-US"/>
           </a:p>
@@ -2544,7 +2550,7 @@
           <a:p>
             <a:fld id="{C50CB83D-D45D-C944-BFF6-54245A66EDFC}" type="datetimeFigureOut">
               <a:rPr lang="en-US" smtClean="0"/>
-              <a:t>6/27/18</a:t>
+              <a:t>7/13/18</a:t>
             </a:fld>
             <a:endParaRPr lang="en-US"/>
           </a:p>
@@ -2809,7 +2815,7 @@
           <a:p>
             <a:fld id="{C50CB83D-D45D-C944-BFF6-54245A66EDFC}" type="datetimeFigureOut">
               <a:rPr lang="en-US" smtClean="0"/>
-              <a:t>6/27/18</a:t>
+              <a:t>7/13/18</a:t>
             </a:fld>
             <a:endParaRPr lang="en-US"/>
           </a:p>
@@ -3221,7 +3227,7 @@
           <a:p>
             <a:fld id="{C50CB83D-D45D-C944-BFF6-54245A66EDFC}" type="datetimeFigureOut">
               <a:rPr lang="en-US" smtClean="0"/>
-              <a:t>6/27/18</a:t>
+              <a:t>7/13/18</a:t>
             </a:fld>
             <a:endParaRPr lang="en-US"/>
           </a:p>
@@ -3362,7 +3368,7 @@
           <a:p>
             <a:fld id="{C50CB83D-D45D-C944-BFF6-54245A66EDFC}" type="datetimeFigureOut">
               <a:rPr lang="en-US" smtClean="0"/>
-              <a:t>6/27/18</a:t>
+              <a:t>7/13/18</a:t>
             </a:fld>
             <a:endParaRPr lang="en-US"/>
           </a:p>
@@ -3475,7 +3481,7 @@
           <a:p>
             <a:fld id="{C50CB83D-D45D-C944-BFF6-54245A66EDFC}" type="datetimeFigureOut">
               <a:rPr lang="en-US" smtClean="0"/>
-              <a:t>6/27/18</a:t>
+              <a:t>7/13/18</a:t>
             </a:fld>
             <a:endParaRPr lang="en-US"/>
           </a:p>
@@ -3786,7 +3792,7 @@
           <a:p>
             <a:fld id="{C50CB83D-D45D-C944-BFF6-54245A66EDFC}" type="datetimeFigureOut">
               <a:rPr lang="en-US" smtClean="0"/>
-              <a:t>6/27/18</a:t>
+              <a:t>7/13/18</a:t>
             </a:fld>
             <a:endParaRPr lang="en-US"/>
           </a:p>
@@ -4074,7 +4080,7 @@
           <a:p>
             <a:fld id="{C50CB83D-D45D-C944-BFF6-54245A66EDFC}" type="datetimeFigureOut">
               <a:rPr lang="en-US" smtClean="0"/>
-              <a:t>6/27/18</a:t>
+              <a:t>7/13/18</a:t>
             </a:fld>
             <a:endParaRPr lang="en-US"/>
           </a:p>
@@ -4315,7 +4321,7 @@
           <a:p>
             <a:fld id="{C50CB83D-D45D-C944-BFF6-54245A66EDFC}" type="datetimeFigureOut">
               <a:rPr lang="en-US" smtClean="0"/>
-              <a:t>6/27/18</a:t>
+              <a:t>7/13/18</a:t>
             </a:fld>
             <a:endParaRPr lang="en-US"/>
           </a:p>
@@ -4781,10 +4787,7 @@
           <a:bodyPr/>
           <a:lstStyle/>
           <a:p>
-            <a:r>
-              <a:rPr lang="en-US" dirty="0"/>
-              <a:t>Can you beat an AI?  </a:t>
-            </a:r>
+            <a:endParaRPr lang="en-US" dirty="0"/>
           </a:p>
         </p:txBody>
       </p:sp>
@@ -5590,7 +5593,7 @@
           <a:p>
             <a:r>
               <a:rPr lang="en-US" dirty="0"/>
-              <a:t>We will teach the computer to ‘read’ articles and headlines and decide if the articles and headlines AGREE, DISAGREE, DISCUSS similar topics, or are UNRELATED</a:t>
+              <a:t>We will teach the computer to read articles and headlines and decide if the articles and headlines AGREE, DISAGREE, DISCUSS similar topics, or are UNRELATED</a:t>
             </a:r>
           </a:p>
         </p:txBody>
@@ -5659,13 +5662,13 @@
           <a:p>
             <a:r>
               <a:rPr lang="en-US" dirty="0"/>
-              <a:t>We will teach the computer to ‘read’ articles and headlines and decide if the articles and headlines AGREE, DISAGREE, DISCUSS similar topics, or are UNRELATED</a:t>
+              <a:t>We will teach the computer to read articles and headlines and decide if the articles and headlines AGREE, DISAGREE, DISCUSS similar topics, or are UNRELATED</a:t>
             </a:r>
           </a:p>
           <a:p>
             <a:r>
               <a:rPr lang="en-US" dirty="0"/>
-              <a:t>Let’s get started!</a:t>
+              <a:t>How well do you think a computer will perform at this task?  Discuss this amongst yourselves</a:t>
             </a:r>
           </a:p>
         </p:txBody>
@@ -5674,6 +5677,87 @@
     <p:extLst>
       <p:ext uri="{BB962C8B-B14F-4D97-AF65-F5344CB8AC3E}">
         <p14:creationId xmlns:p14="http://schemas.microsoft.com/office/powerpoint/2010/main" val="792137434"/>
+      </p:ext>
+    </p:extLst>
+  </p:cSld>
+  <p:clrMapOvr>
+    <a:masterClrMapping/>
+  </p:clrMapOvr>
+</p:sld>
+</file>
+
+<file path=ppt/slides/slide17.xml><?xml version="1.0" encoding="utf-8"?>
+<p:sld xmlns:a="http://schemas.openxmlformats.org/drawingml/2006/main" xmlns:r="http://schemas.openxmlformats.org/officeDocument/2006/relationships" xmlns:p="http://schemas.openxmlformats.org/presentationml/2006/main">
+  <p:cSld>
+    <p:spTree>
+      <p:nvGrpSpPr>
+        <p:cNvPr id="1" name=""/>
+        <p:cNvGrpSpPr/>
+        <p:nvPr/>
+      </p:nvGrpSpPr>
+      <p:grpSpPr>
+        <a:xfrm>
+          <a:off x="0" y="0"/>
+          <a:ext cx="0" cy="0"/>
+          <a:chOff x="0" y="0"/>
+          <a:chExt cx="0" cy="0"/>
+        </a:xfrm>
+      </p:grpSpPr>
+      <p:sp>
+        <p:nvSpPr>
+          <p:cNvPr id="3" name="Content Placeholder 2">
+            <a:extLst>
+              <a:ext uri="{FF2B5EF4-FFF2-40B4-BE49-F238E27FC236}">
+                <a16:creationId xmlns:a16="http://schemas.microsoft.com/office/drawing/2014/main" id="{F8CC2F9B-5A02-F14F-8C75-390E27D541E8}"/>
+              </a:ext>
+            </a:extLst>
+          </p:cNvPr>
+          <p:cNvSpPr>
+            <a:spLocks noGrp="1"/>
+          </p:cNvSpPr>
+          <p:nvPr>
+            <p:ph idx="1"/>
+          </p:nvPr>
+        </p:nvSpPr>
+        <p:spPr>
+          <a:xfrm>
+            <a:off x="838200" y="714375"/>
+            <a:ext cx="10515600" cy="5462588"/>
+          </a:xfrm>
+        </p:spPr>
+        <p:txBody>
+          <a:bodyPr/>
+          <a:lstStyle/>
+          <a:p>
+            <a:r>
+              <a:rPr lang="en-US" dirty="0"/>
+              <a:t>Over the course of the next 3 weeks, we are going to train a computer to do the task you just did</a:t>
+            </a:r>
+          </a:p>
+          <a:p>
+            <a:r>
+              <a:rPr lang="en-US" dirty="0"/>
+              <a:t>We will teach the computer to read articles and headlines and decide if the articles and headlines AGREE, DISAGREE, DISCUSS similar topics, or are UNRELATED</a:t>
+            </a:r>
+          </a:p>
+          <a:p>
+            <a:r>
+              <a:rPr lang="en-US" dirty="0"/>
+              <a:t>How well do you think a computer will perform at this task?  Discuss this amongst yourselves</a:t>
+            </a:r>
+          </a:p>
+          <a:p>
+            <a:r>
+              <a:rPr lang="en-US" dirty="0"/>
+              <a:t>Let’s get started!</a:t>
+            </a:r>
+          </a:p>
+        </p:txBody>
+      </p:sp>
+    </p:spTree>
+    <p:extLst>
+      <p:ext uri="{BB962C8B-B14F-4D97-AF65-F5344CB8AC3E}">
+        <p14:creationId xmlns:p14="http://schemas.microsoft.com/office/powerpoint/2010/main" val="203052168"/>
       </p:ext>
     </p:extLst>
   </p:cSld>

</xml_diff>